<commit_message>
Probability file added for R
</commit_message>
<xml_diff>
--- a/DA using R/W3/Probability.pptx
+++ b/DA using R/W3/Probability.pptx
@@ -3251,6 +3251,12 @@
       <dgm:t>
         <a:bodyPr/>
         <a:lstStyle/>
+        <a:p>
+          <a:r>
+            <a:rPr lang="en-US" dirty="0"/>
+            <a:t>Probability is a long-run relative frequency.</a:t>
+          </a:r>
+        </a:p>
         <a:p>
           <a:r>
             <a:rPr lang="en-US" dirty="0"/>
@@ -4243,12 +4249,12 @@
         <a:fontRef idx="minor"/>
       </dsp:style>
       <dsp:txBody>
-        <a:bodyPr spcFirstLastPara="0" vert="horz" wrap="square" lIns="95250" tIns="95250" rIns="95250" bIns="95250" numCol="1" spcCol="1270" anchor="t" anchorCtr="0">
+        <a:bodyPr spcFirstLastPara="0" vert="horz" wrap="square" lIns="68580" tIns="68580" rIns="68580" bIns="68580" numCol="1" spcCol="1270" anchor="t" anchorCtr="0">
           <a:noAutofit/>
         </a:bodyPr>
         <a:lstStyle/>
         <a:p>
-          <a:pPr marL="0" lvl="0" indent="0" algn="l" defTabSz="1111250">
+          <a:pPr marL="0" lvl="0" indent="0" algn="l" defTabSz="800100">
             <a:lnSpc>
               <a:spcPct val="90000"/>
             </a:lnSpc>
@@ -4261,7 +4267,25 @@
             <a:buNone/>
           </a:pPr>
           <a:r>
-            <a:rPr lang="en-US" sz="2500" kern="1200" dirty="0"/>
+            <a:rPr lang="en-US" sz="1800" kern="1200" dirty="0"/>
+            <a:t>Probability is a long-run relative frequency.</a:t>
+          </a:r>
+        </a:p>
+        <a:p>
+          <a:pPr marL="0" lvl="0" indent="0" algn="l" defTabSz="800100">
+            <a:lnSpc>
+              <a:spcPct val="90000"/>
+            </a:lnSpc>
+            <a:spcBef>
+              <a:spcPct val="0"/>
+            </a:spcBef>
+            <a:spcAft>
+              <a:spcPct val="35000"/>
+            </a:spcAft>
+            <a:buNone/>
+          </a:pPr>
+          <a:r>
+            <a:rPr lang="en-US" sz="1800" kern="1200" dirty="0"/>
             <a:t>Experiments are operations carried out in order to find something or to test some hypothesis.</a:t>
           </a:r>
         </a:p>
@@ -4353,12 +4377,12 @@
         <a:fontRef idx="minor"/>
       </dsp:style>
       <dsp:txBody>
-        <a:bodyPr spcFirstLastPara="0" vert="horz" wrap="square" lIns="95250" tIns="95250" rIns="95250" bIns="95250" numCol="1" spcCol="1270" anchor="t" anchorCtr="0">
+        <a:bodyPr spcFirstLastPara="0" vert="horz" wrap="square" lIns="68580" tIns="68580" rIns="68580" bIns="68580" numCol="1" spcCol="1270" anchor="t" anchorCtr="0">
           <a:noAutofit/>
         </a:bodyPr>
         <a:lstStyle/>
         <a:p>
-          <a:pPr marL="0" lvl="0" indent="0" algn="l" defTabSz="1111250">
+          <a:pPr marL="0" lvl="0" indent="0" algn="l" defTabSz="800100">
             <a:lnSpc>
               <a:spcPct val="90000"/>
             </a:lnSpc>
@@ -4371,7 +4395,7 @@
             <a:buNone/>
           </a:pPr>
           <a:r>
-            <a:rPr lang="en-US" sz="2500" kern="1200"/>
+            <a:rPr lang="en-US" sz="1800" kern="1200"/>
             <a:t>Randomness:- The outcome cannot be precisely predicted.</a:t>
           </a:r>
         </a:p>
@@ -4463,12 +4487,12 @@
         <a:fontRef idx="minor"/>
       </dsp:style>
       <dsp:txBody>
-        <a:bodyPr spcFirstLastPara="0" vert="horz" wrap="square" lIns="95250" tIns="95250" rIns="95250" bIns="95250" numCol="1" spcCol="1270" anchor="t" anchorCtr="0">
+        <a:bodyPr spcFirstLastPara="0" vert="horz" wrap="square" lIns="68580" tIns="68580" rIns="68580" bIns="68580" numCol="1" spcCol="1270" anchor="t" anchorCtr="0">
           <a:noAutofit/>
         </a:bodyPr>
         <a:lstStyle/>
         <a:p>
-          <a:pPr marL="0" lvl="0" indent="0" algn="l" defTabSz="1111250">
+          <a:pPr marL="0" lvl="0" indent="0" algn="l" defTabSz="800100">
             <a:lnSpc>
               <a:spcPct val="90000"/>
             </a:lnSpc>
@@ -4481,7 +4505,7 @@
             <a:buNone/>
           </a:pPr>
           <a:r>
-            <a:rPr lang="en-US" sz="2500" kern="1200"/>
+            <a:rPr lang="en-US" sz="1800" kern="1200"/>
             <a:t>Random Experiment:- A process of yielding a result.</a:t>
           </a:r>
         </a:p>
@@ -4573,12 +4597,12 @@
         <a:fontRef idx="minor"/>
       </dsp:style>
       <dsp:txBody>
-        <a:bodyPr spcFirstLastPara="0" vert="horz" wrap="square" lIns="95250" tIns="95250" rIns="95250" bIns="95250" numCol="1" spcCol="1270" anchor="t" anchorCtr="0">
+        <a:bodyPr spcFirstLastPara="0" vert="horz" wrap="square" lIns="68580" tIns="68580" rIns="68580" bIns="68580" numCol="1" spcCol="1270" anchor="t" anchorCtr="0">
           <a:noAutofit/>
         </a:bodyPr>
         <a:lstStyle/>
         <a:p>
-          <a:pPr marL="0" lvl="0" indent="0" algn="l" defTabSz="1111250">
+          <a:pPr marL="0" lvl="0" indent="0" algn="l" defTabSz="800100">
             <a:lnSpc>
               <a:spcPct val="90000"/>
             </a:lnSpc>
@@ -4591,7 +4615,7 @@
             <a:buNone/>
           </a:pPr>
           <a:r>
-            <a:rPr lang="en-US" sz="2500" kern="1200"/>
+            <a:rPr lang="en-US" sz="1800" kern="1200"/>
             <a:t>Event (E) :- Any outcome of an experiments.</a:t>
           </a:r>
         </a:p>
@@ -4683,12 +4707,12 @@
         <a:fontRef idx="minor"/>
       </dsp:style>
       <dsp:txBody>
-        <a:bodyPr spcFirstLastPara="0" vert="horz" wrap="square" lIns="95250" tIns="95250" rIns="95250" bIns="95250" numCol="1" spcCol="1270" anchor="t" anchorCtr="0">
+        <a:bodyPr spcFirstLastPara="0" vert="horz" wrap="square" lIns="68580" tIns="68580" rIns="68580" bIns="68580" numCol="1" spcCol="1270" anchor="t" anchorCtr="0">
           <a:noAutofit/>
         </a:bodyPr>
         <a:lstStyle/>
         <a:p>
-          <a:pPr marL="0" lvl="0" indent="0" algn="l" defTabSz="1111250">
+          <a:pPr marL="0" lvl="0" indent="0" algn="l" defTabSz="800100">
             <a:lnSpc>
               <a:spcPct val="90000"/>
             </a:lnSpc>
@@ -4701,7 +4725,7 @@
             <a:buNone/>
           </a:pPr>
           <a:r>
-            <a:rPr lang="en-US" sz="2500" kern="1200"/>
+            <a:rPr lang="en-US" sz="1800" kern="1200"/>
             <a:t>Sample Space:- All possible outcome of an experiment.</a:t>
           </a:r>
         </a:p>
@@ -18208,7 +18232,7 @@
             <p:ph idx="1"/>
             <p:extLst>
               <p:ext uri="{D42A27DB-BD31-4B8C-83A1-F6EECF244321}">
-                <p14:modId xmlns:p14="http://schemas.microsoft.com/office/powerpoint/2010/main" val="3140212903"/>
+                <p14:modId xmlns:p14="http://schemas.microsoft.com/office/powerpoint/2010/main" val="1282016135"/>
               </p:ext>
             </p:extLst>
           </p:nvPr>
@@ -18693,7 +18717,7 @@
                   <a:srgbClr val="000000"/>
                 </a:solidFill>
               </a:rPr>
-              <a:t> Sample space {1,2,3,4,5,6}</a:t>
+              <a:t> Sample space:- {1,2,3,4,5,6}</a:t>
             </a:r>
           </a:p>
           <a:p>

</xml_diff>